<commit_message>
Change demo app & slide
</commit_message>
<xml_diff>
--- a/doc/research/RESEARCH_RoR_Jquery_DUCQUACH.pptx
+++ b/doc/research/RESEARCH_RoR_Jquery_DUCQUACH.pptx
@@ -79,7 +79,7 @@
         <p:spPr>
           <a:xfrm>
             <a:off x="504000" y="301320"/>
-            <a:ext cx="9071280" cy="1262160"/>
+            <a:ext cx="9072000" cy="1262160"/>
           </a:xfrm>
           <a:prstGeom prst="rect">
             <a:avLst/>
@@ -106,7 +106,7 @@
         <p:spPr>
           <a:xfrm>
             <a:off x="504000" y="1768680"/>
-            <a:ext cx="9071640" cy="2090880"/>
+            <a:ext cx="9072000" cy="2090880"/>
           </a:xfrm>
           <a:prstGeom prst="rect">
             <a:avLst/>
@@ -132,7 +132,7 @@
         <p:spPr>
           <a:xfrm>
             <a:off x="504000" y="4058640"/>
-            <a:ext cx="9071640" cy="2090880"/>
+            <a:ext cx="9072000" cy="2090880"/>
           </a:xfrm>
           <a:prstGeom prst="rect">
             <a:avLst/>
@@ -180,7 +180,7 @@
         <p:spPr>
           <a:xfrm>
             <a:off x="504000" y="301320"/>
-            <a:ext cx="9071280" cy="1262160"/>
+            <a:ext cx="9072000" cy="1262160"/>
           </a:xfrm>
           <a:prstGeom prst="rect">
             <a:avLst/>
@@ -333,7 +333,7 @@
         <p:spPr>
           <a:xfrm>
             <a:off x="504000" y="301320"/>
-            <a:ext cx="9071280" cy="1262160"/>
+            <a:ext cx="9072000" cy="1262160"/>
           </a:xfrm>
           <a:prstGeom prst="rect">
             <a:avLst/>
@@ -360,7 +360,7 @@
         <p:spPr>
           <a:xfrm>
             <a:off x="504000" y="1768680"/>
-            <a:ext cx="9071640" cy="4383720"/>
+            <a:ext cx="9072000" cy="4384080"/>
           </a:xfrm>
           <a:prstGeom prst="rect">
             <a:avLst/>
@@ -386,7 +386,7 @@
         <p:spPr>
           <a:xfrm>
             <a:off x="504000" y="1768680"/>
-            <a:ext cx="9071640" cy="4383720"/>
+            <a:ext cx="9072000" cy="4384080"/>
           </a:xfrm>
           <a:prstGeom prst="rect">
             <a:avLst/>
@@ -413,8 +413,8 @@
         </p:blipFill>
         <p:spPr>
           <a:xfrm>
-            <a:off x="2292480" y="1768320"/>
-            <a:ext cx="5494320" cy="4383720"/>
+            <a:off x="2292480" y="1768680"/>
+            <a:ext cx="5494680" cy="4384080"/>
           </a:xfrm>
           <a:prstGeom prst="rect">
             <a:avLst/>
@@ -438,8 +438,8 @@
         </p:blipFill>
         <p:spPr>
           <a:xfrm>
-            <a:off x="2292480" y="1768320"/>
-            <a:ext cx="5494320" cy="4383720"/>
+            <a:off x="2292480" y="1768680"/>
+            <a:ext cx="5494680" cy="4384080"/>
           </a:xfrm>
           <a:prstGeom prst="rect">
             <a:avLst/>
@@ -506,7 +506,7 @@
         <p:spPr>
           <a:xfrm>
             <a:off x="504000" y="301320"/>
-            <a:ext cx="9071280" cy="1262160"/>
+            <a:ext cx="9072000" cy="1262160"/>
           </a:xfrm>
           <a:prstGeom prst="rect">
             <a:avLst/>
@@ -533,7 +533,7 @@
         <p:spPr>
           <a:xfrm>
             <a:off x="504000" y="1768680"/>
-            <a:ext cx="9071640" cy="4384080"/>
+            <a:ext cx="9072000" cy="4384440"/>
           </a:xfrm>
           <a:prstGeom prst="rect">
             <a:avLst/>
@@ -582,7 +582,7 @@
         <p:spPr>
           <a:xfrm>
             <a:off x="504000" y="301320"/>
-            <a:ext cx="9071280" cy="1262160"/>
+            <a:ext cx="9072000" cy="1262160"/>
           </a:xfrm>
           <a:prstGeom prst="rect">
             <a:avLst/>
@@ -609,7 +609,7 @@
         <p:spPr>
           <a:xfrm>
             <a:off x="504000" y="1768680"/>
-            <a:ext cx="9071640" cy="4383720"/>
+            <a:ext cx="9072000" cy="4384080"/>
           </a:xfrm>
           <a:prstGeom prst="rect">
             <a:avLst/>
@@ -657,7 +657,7 @@
         <p:spPr>
           <a:xfrm>
             <a:off x="504000" y="301320"/>
-            <a:ext cx="9071280" cy="1262160"/>
+            <a:ext cx="9072000" cy="1262160"/>
           </a:xfrm>
           <a:prstGeom prst="rect">
             <a:avLst/>
@@ -684,7 +684,7 @@
         <p:spPr>
           <a:xfrm>
             <a:off x="504000" y="1768680"/>
-            <a:ext cx="4426920" cy="4383720"/>
+            <a:ext cx="4426920" cy="4384080"/>
           </a:xfrm>
           <a:prstGeom prst="rect">
             <a:avLst/>
@@ -710,7 +710,7 @@
         <p:spPr>
           <a:xfrm>
             <a:off x="5152680" y="1768680"/>
-            <a:ext cx="4426920" cy="4383720"/>
+            <a:ext cx="4426920" cy="4384080"/>
           </a:xfrm>
           <a:prstGeom prst="rect">
             <a:avLst/>
@@ -758,7 +758,7 @@
         <p:spPr>
           <a:xfrm>
             <a:off x="504000" y="301320"/>
-            <a:ext cx="9071280" cy="1262160"/>
+            <a:ext cx="9072000" cy="1262160"/>
           </a:xfrm>
           <a:prstGeom prst="rect">
             <a:avLst/>
@@ -807,7 +807,7 @@
         <p:spPr>
           <a:xfrm>
             <a:off x="504000" y="301320"/>
-            <a:ext cx="9071280" cy="5850720"/>
+            <a:ext cx="9072000" cy="5850720"/>
           </a:xfrm>
           <a:prstGeom prst="rect">
             <a:avLst/>
@@ -856,7 +856,7 @@
         <p:spPr>
           <a:xfrm>
             <a:off x="504000" y="301320"/>
-            <a:ext cx="9071280" cy="1262160"/>
+            <a:ext cx="9072000" cy="1262160"/>
           </a:xfrm>
           <a:prstGeom prst="rect">
             <a:avLst/>
@@ -935,7 +935,7 @@
         <p:spPr>
           <a:xfrm>
             <a:off x="5152680" y="1768680"/>
-            <a:ext cx="4426920" cy="4383720"/>
+            <a:ext cx="4426920" cy="4384080"/>
           </a:xfrm>
           <a:prstGeom prst="rect">
             <a:avLst/>
@@ -983,7 +983,7 @@
         <p:spPr>
           <a:xfrm>
             <a:off x="504000" y="301320"/>
-            <a:ext cx="9071280" cy="1262160"/>
+            <a:ext cx="9072000" cy="1262160"/>
           </a:xfrm>
           <a:prstGeom prst="rect">
             <a:avLst/>
@@ -1010,7 +1010,7 @@
         <p:spPr>
           <a:xfrm>
             <a:off x="504000" y="1768680"/>
-            <a:ext cx="9071640" cy="4384080"/>
+            <a:ext cx="9072000" cy="4384440"/>
           </a:xfrm>
           <a:prstGeom prst="rect">
             <a:avLst/>
@@ -1059,7 +1059,7 @@
         <p:spPr>
           <a:xfrm>
             <a:off x="504000" y="301320"/>
-            <a:ext cx="9071280" cy="1262160"/>
+            <a:ext cx="9072000" cy="1262160"/>
           </a:xfrm>
           <a:prstGeom prst="rect">
             <a:avLst/>
@@ -1086,7 +1086,7 @@
         <p:spPr>
           <a:xfrm>
             <a:off x="504000" y="1768680"/>
-            <a:ext cx="4426920" cy="4383720"/>
+            <a:ext cx="4426920" cy="4384080"/>
           </a:xfrm>
           <a:prstGeom prst="rect">
             <a:avLst/>
@@ -1186,7 +1186,7 @@
         <p:spPr>
           <a:xfrm>
             <a:off x="504000" y="301320"/>
-            <a:ext cx="9071280" cy="1262160"/>
+            <a:ext cx="9072000" cy="1262160"/>
           </a:xfrm>
           <a:prstGeom prst="rect">
             <a:avLst/>
@@ -1265,7 +1265,7 @@
         <p:spPr>
           <a:xfrm>
             <a:off x="504000" y="4058640"/>
-            <a:ext cx="9071640" cy="2090880"/>
+            <a:ext cx="9072000" cy="2090880"/>
           </a:xfrm>
           <a:prstGeom prst="rect">
             <a:avLst/>
@@ -1313,7 +1313,7 @@
         <p:spPr>
           <a:xfrm>
             <a:off x="504000" y="301320"/>
-            <a:ext cx="9071280" cy="1262160"/>
+            <a:ext cx="9072000" cy="1262160"/>
           </a:xfrm>
           <a:prstGeom prst="rect">
             <a:avLst/>
@@ -1340,7 +1340,7 @@
         <p:spPr>
           <a:xfrm>
             <a:off x="504000" y="1768680"/>
-            <a:ext cx="9071640" cy="2090880"/>
+            <a:ext cx="9072000" cy="2090880"/>
           </a:xfrm>
           <a:prstGeom prst="rect">
             <a:avLst/>
@@ -1366,7 +1366,7 @@
         <p:spPr>
           <a:xfrm>
             <a:off x="504000" y="4058640"/>
-            <a:ext cx="9071640" cy="2090880"/>
+            <a:ext cx="9072000" cy="2090880"/>
           </a:xfrm>
           <a:prstGeom prst="rect">
             <a:avLst/>
@@ -1414,7 +1414,7 @@
         <p:spPr>
           <a:xfrm>
             <a:off x="504000" y="301320"/>
-            <a:ext cx="9071280" cy="1262160"/>
+            <a:ext cx="9072000" cy="1262160"/>
           </a:xfrm>
           <a:prstGeom prst="rect">
             <a:avLst/>
@@ -1567,7 +1567,7 @@
         <p:spPr>
           <a:xfrm>
             <a:off x="504000" y="301320"/>
-            <a:ext cx="9071280" cy="1262160"/>
+            <a:ext cx="9072000" cy="1262160"/>
           </a:xfrm>
           <a:prstGeom prst="rect">
             <a:avLst/>
@@ -1594,7 +1594,7 @@
         <p:spPr>
           <a:xfrm>
             <a:off x="504000" y="1768680"/>
-            <a:ext cx="9071640" cy="4383720"/>
+            <a:ext cx="9072000" cy="4384080"/>
           </a:xfrm>
           <a:prstGeom prst="rect">
             <a:avLst/>
@@ -1620,7 +1620,7 @@
         <p:spPr>
           <a:xfrm>
             <a:off x="504000" y="1768680"/>
-            <a:ext cx="9071640" cy="4383720"/>
+            <a:ext cx="9072000" cy="4384080"/>
           </a:xfrm>
           <a:prstGeom prst="rect">
             <a:avLst/>
@@ -1647,8 +1647,8 @@
         </p:blipFill>
         <p:spPr>
           <a:xfrm>
-            <a:off x="2292480" y="1768320"/>
-            <a:ext cx="5494320" cy="4383720"/>
+            <a:off x="2292480" y="1768680"/>
+            <a:ext cx="5494680" cy="4384080"/>
           </a:xfrm>
           <a:prstGeom prst="rect">
             <a:avLst/>
@@ -1672,8 +1672,8 @@
         </p:blipFill>
         <p:spPr>
           <a:xfrm>
-            <a:off x="2292480" y="1768320"/>
-            <a:ext cx="5494320" cy="4383720"/>
+            <a:off x="2292480" y="1768680"/>
+            <a:ext cx="5494680" cy="4384080"/>
           </a:xfrm>
           <a:prstGeom prst="rect">
             <a:avLst/>
@@ -1740,7 +1740,7 @@
         <p:spPr>
           <a:xfrm>
             <a:off x="504000" y="301320"/>
-            <a:ext cx="9071280" cy="1262160"/>
+            <a:ext cx="9072000" cy="1262160"/>
           </a:xfrm>
           <a:prstGeom prst="rect">
             <a:avLst/>
@@ -1767,7 +1767,7 @@
         <p:spPr>
           <a:xfrm>
             <a:off x="504000" y="1768680"/>
-            <a:ext cx="9071640" cy="4384080"/>
+            <a:ext cx="9072000" cy="4384440"/>
           </a:xfrm>
           <a:prstGeom prst="rect">
             <a:avLst/>
@@ -1816,7 +1816,7 @@
         <p:spPr>
           <a:xfrm>
             <a:off x="504000" y="301320"/>
-            <a:ext cx="9071280" cy="1262160"/>
+            <a:ext cx="9072000" cy="1262160"/>
           </a:xfrm>
           <a:prstGeom prst="rect">
             <a:avLst/>
@@ -1843,7 +1843,7 @@
         <p:spPr>
           <a:xfrm>
             <a:off x="504000" y="1768680"/>
-            <a:ext cx="9071640" cy="4383720"/>
+            <a:ext cx="9072000" cy="4384080"/>
           </a:xfrm>
           <a:prstGeom prst="rect">
             <a:avLst/>
@@ -1891,7 +1891,7 @@
         <p:spPr>
           <a:xfrm>
             <a:off x="504000" y="301320"/>
-            <a:ext cx="9071280" cy="1262160"/>
+            <a:ext cx="9072000" cy="1262160"/>
           </a:xfrm>
           <a:prstGeom prst="rect">
             <a:avLst/>
@@ -1918,7 +1918,7 @@
         <p:spPr>
           <a:xfrm>
             <a:off x="504000" y="1768680"/>
-            <a:ext cx="4426920" cy="4383720"/>
+            <a:ext cx="4426920" cy="4384080"/>
           </a:xfrm>
           <a:prstGeom prst="rect">
             <a:avLst/>
@@ -1944,7 +1944,7 @@
         <p:spPr>
           <a:xfrm>
             <a:off x="5152680" y="1768680"/>
-            <a:ext cx="4426920" cy="4383720"/>
+            <a:ext cx="4426920" cy="4384080"/>
           </a:xfrm>
           <a:prstGeom prst="rect">
             <a:avLst/>
@@ -1992,7 +1992,7 @@
         <p:spPr>
           <a:xfrm>
             <a:off x="504000" y="301320"/>
-            <a:ext cx="9071280" cy="1262160"/>
+            <a:ext cx="9072000" cy="1262160"/>
           </a:xfrm>
           <a:prstGeom prst="rect">
             <a:avLst/>
@@ -2041,7 +2041,7 @@
         <p:spPr>
           <a:xfrm>
             <a:off x="504000" y="301320"/>
-            <a:ext cx="9071280" cy="1262160"/>
+            <a:ext cx="9072000" cy="1262160"/>
           </a:xfrm>
           <a:prstGeom prst="rect">
             <a:avLst/>
@@ -2068,7 +2068,7 @@
         <p:spPr>
           <a:xfrm>
             <a:off x="504000" y="1768680"/>
-            <a:ext cx="9071640" cy="4383720"/>
+            <a:ext cx="9072000" cy="4384080"/>
           </a:xfrm>
           <a:prstGeom prst="rect">
             <a:avLst/>
@@ -2116,7 +2116,7 @@
         <p:spPr>
           <a:xfrm>
             <a:off x="504000" y="301320"/>
-            <a:ext cx="9071280" cy="5850720"/>
+            <a:ext cx="9072000" cy="5850720"/>
           </a:xfrm>
           <a:prstGeom prst="rect">
             <a:avLst/>
@@ -2165,7 +2165,7 @@
         <p:spPr>
           <a:xfrm>
             <a:off x="504000" y="301320"/>
-            <a:ext cx="9071280" cy="1262160"/>
+            <a:ext cx="9072000" cy="1262160"/>
           </a:xfrm>
           <a:prstGeom prst="rect">
             <a:avLst/>
@@ -2244,7 +2244,7 @@
         <p:spPr>
           <a:xfrm>
             <a:off x="5152680" y="1768680"/>
-            <a:ext cx="4426920" cy="4383720"/>
+            <a:ext cx="4426920" cy="4384080"/>
           </a:xfrm>
           <a:prstGeom prst="rect">
             <a:avLst/>
@@ -2292,7 +2292,7 @@
         <p:spPr>
           <a:xfrm>
             <a:off x="504000" y="301320"/>
-            <a:ext cx="9071280" cy="1262160"/>
+            <a:ext cx="9072000" cy="1262160"/>
           </a:xfrm>
           <a:prstGeom prst="rect">
             <a:avLst/>
@@ -2319,7 +2319,7 @@
         <p:spPr>
           <a:xfrm>
             <a:off x="504000" y="1768680"/>
-            <a:ext cx="4426920" cy="4383720"/>
+            <a:ext cx="4426920" cy="4384080"/>
           </a:xfrm>
           <a:prstGeom prst="rect">
             <a:avLst/>
@@ -2419,7 +2419,7 @@
         <p:spPr>
           <a:xfrm>
             <a:off x="504000" y="301320"/>
-            <a:ext cx="9071280" cy="1262160"/>
+            <a:ext cx="9072000" cy="1262160"/>
           </a:xfrm>
           <a:prstGeom prst="rect">
             <a:avLst/>
@@ -2498,7 +2498,7 @@
         <p:spPr>
           <a:xfrm>
             <a:off x="504000" y="4058640"/>
-            <a:ext cx="9071640" cy="2090880"/>
+            <a:ext cx="9072000" cy="2090880"/>
           </a:xfrm>
           <a:prstGeom prst="rect">
             <a:avLst/>
@@ -2546,7 +2546,7 @@
         <p:spPr>
           <a:xfrm>
             <a:off x="504000" y="301320"/>
-            <a:ext cx="9071280" cy="1262160"/>
+            <a:ext cx="9072000" cy="1262160"/>
           </a:xfrm>
           <a:prstGeom prst="rect">
             <a:avLst/>
@@ -2573,7 +2573,7 @@
         <p:spPr>
           <a:xfrm>
             <a:off x="504000" y="1768680"/>
-            <a:ext cx="9071640" cy="2090880"/>
+            <a:ext cx="9072000" cy="2090880"/>
           </a:xfrm>
           <a:prstGeom prst="rect">
             <a:avLst/>
@@ -2599,7 +2599,7 @@
         <p:spPr>
           <a:xfrm>
             <a:off x="504000" y="4058640"/>
-            <a:ext cx="9071640" cy="2090880"/>
+            <a:ext cx="9072000" cy="2090880"/>
           </a:xfrm>
           <a:prstGeom prst="rect">
             <a:avLst/>
@@ -2647,7 +2647,7 @@
         <p:spPr>
           <a:xfrm>
             <a:off x="504000" y="301320"/>
-            <a:ext cx="9071280" cy="1262160"/>
+            <a:ext cx="9072000" cy="1262160"/>
           </a:xfrm>
           <a:prstGeom prst="rect">
             <a:avLst/>
@@ -2800,7 +2800,7 @@
         <p:spPr>
           <a:xfrm>
             <a:off x="504000" y="301320"/>
-            <a:ext cx="9071280" cy="1262160"/>
+            <a:ext cx="9072000" cy="1262160"/>
           </a:xfrm>
           <a:prstGeom prst="rect">
             <a:avLst/>
@@ -2827,7 +2827,7 @@
         <p:spPr>
           <a:xfrm>
             <a:off x="504000" y="1768680"/>
-            <a:ext cx="9071640" cy="4383720"/>
+            <a:ext cx="9072000" cy="4384080"/>
           </a:xfrm>
           <a:prstGeom prst="rect">
             <a:avLst/>
@@ -2853,7 +2853,7 @@
         <p:spPr>
           <a:xfrm>
             <a:off x="504000" y="1768680"/>
-            <a:ext cx="9071640" cy="4383720"/>
+            <a:ext cx="9072000" cy="4384080"/>
           </a:xfrm>
           <a:prstGeom prst="rect">
             <a:avLst/>
@@ -2880,8 +2880,8 @@
         </p:blipFill>
         <p:spPr>
           <a:xfrm>
-            <a:off x="2292480" y="1768320"/>
-            <a:ext cx="5494320" cy="4383720"/>
+            <a:off x="2292480" y="1768680"/>
+            <a:ext cx="5494680" cy="4384080"/>
           </a:xfrm>
           <a:prstGeom prst="rect">
             <a:avLst/>
@@ -2905,8 +2905,8 @@
         </p:blipFill>
         <p:spPr>
           <a:xfrm>
-            <a:off x="2292480" y="1768320"/>
-            <a:ext cx="5494320" cy="4383720"/>
+            <a:off x="2292480" y="1768680"/>
+            <a:ext cx="5494680" cy="4384080"/>
           </a:xfrm>
           <a:prstGeom prst="rect">
             <a:avLst/>
@@ -2951,7 +2951,7 @@
         <p:spPr>
           <a:xfrm>
             <a:off x="504000" y="301320"/>
-            <a:ext cx="9071280" cy="1262160"/>
+            <a:ext cx="9072000" cy="1262160"/>
           </a:xfrm>
           <a:prstGeom prst="rect">
             <a:avLst/>
@@ -2978,7 +2978,7 @@
         <p:spPr>
           <a:xfrm>
             <a:off x="504000" y="1768680"/>
-            <a:ext cx="4426920" cy="4383720"/>
+            <a:ext cx="4426920" cy="4384080"/>
           </a:xfrm>
           <a:prstGeom prst="rect">
             <a:avLst/>
@@ -3004,7 +3004,7 @@
         <p:spPr>
           <a:xfrm>
             <a:off x="5152680" y="1768680"/>
-            <a:ext cx="4426920" cy="4383720"/>
+            <a:ext cx="4426920" cy="4384080"/>
           </a:xfrm>
           <a:prstGeom prst="rect">
             <a:avLst/>
@@ -3052,7 +3052,7 @@
         <p:spPr>
           <a:xfrm>
             <a:off x="504000" y="301320"/>
-            <a:ext cx="9071280" cy="1262160"/>
+            <a:ext cx="9072000" cy="1262160"/>
           </a:xfrm>
           <a:prstGeom prst="rect">
             <a:avLst/>
@@ -3101,7 +3101,7 @@
         <p:spPr>
           <a:xfrm>
             <a:off x="504000" y="301320"/>
-            <a:ext cx="9071280" cy="5850720"/>
+            <a:ext cx="9072000" cy="5850720"/>
           </a:xfrm>
           <a:prstGeom prst="rect">
             <a:avLst/>
@@ -3150,7 +3150,7 @@
         <p:spPr>
           <a:xfrm>
             <a:off x="504000" y="301320"/>
-            <a:ext cx="9071280" cy="1262160"/>
+            <a:ext cx="9072000" cy="1262160"/>
           </a:xfrm>
           <a:prstGeom prst="rect">
             <a:avLst/>
@@ -3229,7 +3229,7 @@
         <p:spPr>
           <a:xfrm>
             <a:off x="5152680" y="1768680"/>
-            <a:ext cx="4426920" cy="4383720"/>
+            <a:ext cx="4426920" cy="4384080"/>
           </a:xfrm>
           <a:prstGeom prst="rect">
             <a:avLst/>
@@ -3277,7 +3277,7 @@
         <p:spPr>
           <a:xfrm>
             <a:off x="504000" y="301320"/>
-            <a:ext cx="9071280" cy="1262160"/>
+            <a:ext cx="9072000" cy="1262160"/>
           </a:xfrm>
           <a:prstGeom prst="rect">
             <a:avLst/>
@@ -3304,7 +3304,7 @@
         <p:spPr>
           <a:xfrm>
             <a:off x="504000" y="1768680"/>
-            <a:ext cx="4426920" cy="4383720"/>
+            <a:ext cx="4426920" cy="4384080"/>
           </a:xfrm>
           <a:prstGeom prst="rect">
             <a:avLst/>
@@ -3404,7 +3404,7 @@
         <p:spPr>
           <a:xfrm>
             <a:off x="504000" y="301320"/>
-            <a:ext cx="9071280" cy="1262160"/>
+            <a:ext cx="9072000" cy="1262160"/>
           </a:xfrm>
           <a:prstGeom prst="rect">
             <a:avLst/>
@@ -3483,7 +3483,7 @@
         <p:spPr>
           <a:xfrm>
             <a:off x="504000" y="4058640"/>
-            <a:ext cx="9071640" cy="2090880"/>
+            <a:ext cx="9072000" cy="2090880"/>
           </a:xfrm>
           <a:prstGeom prst="rect">
             <a:avLst/>
@@ -3913,7 +3913,7 @@
         <p:spPr>
           <a:xfrm>
             <a:off x="504000" y="301320"/>
-            <a:ext cx="9071280" cy="1261800"/>
+            <a:ext cx="9072000" cy="1261800"/>
           </a:xfrm>
           <a:prstGeom prst="rect">
             <a:avLst/>
@@ -3922,8 +3922,9 @@
         <p:txBody>
           <a:bodyPr lIns="0" rIns="0" tIns="0" bIns="0" anchor="ctr"/>
           <a:p>
-            <a:r>
-              <a:rPr lang="en-US">
+            <a:pPr algn="ctr"/>
+            <a:r>
+              <a:rPr lang="en-US" sz="4400">
                 <a:latin typeface="Arial"/>
               </a:rPr>
               <a:t>Click to edit the title text format</a:t>
@@ -3945,7 +3946,7 @@
         <p:spPr>
           <a:xfrm>
             <a:off x="504000" y="1768680"/>
-            <a:ext cx="9071640" cy="4383720"/>
+            <a:ext cx="9072000" cy="4384080"/>
           </a:xfrm>
           <a:prstGeom prst="rect">
             <a:avLst/>
@@ -3960,7 +3961,7 @@
               <a:buChar char=""/>
             </a:pPr>
             <a:r>
-              <a:rPr lang="en-US">
+              <a:rPr lang="en-US" sz="3200">
                 <a:latin typeface="Arial"/>
               </a:rPr>
               <a:t>Click to edit the outline text format</a:t>
@@ -3974,7 +3975,7 @@
               <a:buChar char=""/>
             </a:pPr>
             <a:r>
-              <a:rPr lang="en-US">
+              <a:rPr lang="en-US" sz="2800">
                 <a:latin typeface="Arial"/>
               </a:rPr>
               <a:t>Second Outline Level</a:t>
@@ -3988,7 +3989,7 @@
               <a:buChar char=""/>
             </a:pPr>
             <a:r>
-              <a:rPr lang="en-US">
+              <a:rPr lang="en-US" sz="2400">
                 <a:latin typeface="Arial"/>
               </a:rPr>
               <a:t>Third Outline Level</a:t>
@@ -4002,7 +4003,7 @@
               <a:buChar char=""/>
             </a:pPr>
             <a:r>
-              <a:rPr lang="en-US">
+              <a:rPr lang="en-US" sz="2000">
                 <a:latin typeface="Arial"/>
               </a:rPr>
               <a:t>Fourth Outline Level</a:t>
@@ -4016,7 +4017,7 @@
               <a:buChar char=""/>
             </a:pPr>
             <a:r>
-              <a:rPr lang="en-US">
+              <a:rPr lang="en-US" sz="2000">
                 <a:latin typeface="Arial"/>
               </a:rPr>
               <a:t>Fifth Outline Level</a:t>
@@ -4030,7 +4031,7 @@
               <a:buChar char=""/>
             </a:pPr>
             <a:r>
-              <a:rPr lang="en-US">
+              <a:rPr lang="en-US" sz="2000">
                 <a:latin typeface="Arial"/>
               </a:rPr>
               <a:t>Sixth Outline Level</a:t>
@@ -4044,7 +4045,7 @@
               <a:buChar char=""/>
             </a:pPr>
             <a:r>
-              <a:rPr lang="en-US">
+              <a:rPr lang="en-US" sz="2000">
                 <a:latin typeface="Arial"/>
               </a:rPr>
               <a:t>Seventh Outline Level</a:t>
@@ -4099,7 +4100,7 @@
         <p:spPr>
           <a:xfrm>
             <a:off x="504000" y="301320"/>
-            <a:ext cx="9069840" cy="6555600"/>
+            <a:ext cx="9069480" cy="6555240"/>
           </a:xfrm>
           <a:prstGeom prst="rect">
             <a:avLst/>
@@ -4300,7 +4301,7 @@
         <p:spPr>
           <a:xfrm>
             <a:off x="504000" y="301320"/>
-            <a:ext cx="9071280" cy="1261080"/>
+            <a:ext cx="9070920" cy="1260720"/>
           </a:xfrm>
           <a:prstGeom prst="rect">
             <a:avLst/>
@@ -4320,7 +4321,7 @@
         <p:spPr>
           <a:xfrm>
             <a:off x="504360" y="301320"/>
-            <a:ext cx="9069840" cy="1260360"/>
+            <a:ext cx="9069480" cy="1260000"/>
           </a:xfrm>
           <a:prstGeom prst="rect">
             <a:avLst/>
@@ -4359,7 +4360,7 @@
         <p:spPr>
           <a:xfrm>
             <a:off x="437760" y="2067120"/>
-            <a:ext cx="9187920" cy="6091200"/>
+            <a:ext cx="9187560" cy="6090840"/>
           </a:xfrm>
           <a:prstGeom prst="rect">
             <a:avLst/>
@@ -4423,7 +4424,7 @@
               <a:rPr lang="en-US" sz="3200">
                 <a:latin typeface="Arial"/>
               </a:rPr>
-              <a:t>- Forwords:</a:t>
+              <a:t>- Forwards:</a:t>
             </a:r>
             <a:endParaRPr/>
           </a:p>
@@ -4633,7 +4634,7 @@
         <p:spPr>
           <a:xfrm>
             <a:off x="504000" y="301320"/>
-            <a:ext cx="9071280" cy="1261080"/>
+            <a:ext cx="9070920" cy="1260720"/>
           </a:xfrm>
           <a:prstGeom prst="rect">
             <a:avLst/>
@@ -4653,7 +4654,7 @@
         <p:spPr>
           <a:xfrm>
             <a:off x="504360" y="301320"/>
-            <a:ext cx="9069840" cy="1260360"/>
+            <a:ext cx="9069480" cy="1260000"/>
           </a:xfrm>
           <a:prstGeom prst="rect">
             <a:avLst/>
@@ -4692,7 +4693,7 @@
         <p:spPr>
           <a:xfrm>
             <a:off x="437760" y="2067120"/>
-            <a:ext cx="9187920" cy="6716160"/>
+            <a:ext cx="9187560" cy="6715800"/>
           </a:xfrm>
           <a:prstGeom prst="rect">
             <a:avLst/>
@@ -5020,7 +5021,7 @@
         <p:spPr>
           <a:xfrm>
             <a:off x="504000" y="301320"/>
-            <a:ext cx="9071280" cy="1261080"/>
+            <a:ext cx="9070920" cy="1260720"/>
           </a:xfrm>
           <a:prstGeom prst="rect">
             <a:avLst/>
@@ -5040,7 +5041,7 @@
         <p:spPr>
           <a:xfrm>
             <a:off x="504360" y="301320"/>
-            <a:ext cx="9069840" cy="1260360"/>
+            <a:ext cx="9069480" cy="1260000"/>
           </a:xfrm>
           <a:prstGeom prst="rect">
             <a:avLst/>
@@ -5079,7 +5080,7 @@
         <p:spPr>
           <a:xfrm>
             <a:off x="437760" y="2067120"/>
-            <a:ext cx="9187920" cy="6716160"/>
+            <a:ext cx="9187560" cy="6715800"/>
           </a:xfrm>
           <a:prstGeom prst="rect">
             <a:avLst/>
@@ -5347,7 +5348,7 @@
         <p:spPr>
           <a:xfrm>
             <a:off x="504000" y="301320"/>
-            <a:ext cx="9071280" cy="1261080"/>
+            <a:ext cx="9070920" cy="1260720"/>
           </a:xfrm>
           <a:prstGeom prst="rect">
             <a:avLst/>
@@ -5367,7 +5368,7 @@
         <p:spPr>
           <a:xfrm>
             <a:off x="504360" y="301320"/>
-            <a:ext cx="9069840" cy="1260360"/>
+            <a:ext cx="9069480" cy="1260000"/>
           </a:xfrm>
           <a:prstGeom prst="rect">
             <a:avLst/>
@@ -5406,7 +5407,7 @@
         <p:spPr>
           <a:xfrm>
             <a:off x="437760" y="2067120"/>
-            <a:ext cx="9187920" cy="4973040"/>
+            <a:ext cx="9187560" cy="4972680"/>
           </a:xfrm>
           <a:prstGeom prst="rect">
             <a:avLst/>
@@ -5586,7 +5587,7 @@
         <p:spPr>
           <a:xfrm>
             <a:off x="504000" y="548640"/>
-            <a:ext cx="9071280" cy="6308640"/>
+            <a:ext cx="9070920" cy="6308280"/>
           </a:xfrm>
           <a:prstGeom prst="rect">
             <a:avLst/>
@@ -5612,7 +5613,7 @@
         <p:spPr>
           <a:xfrm>
             <a:off x="813960" y="1920240"/>
-            <a:ext cx="3208680" cy="3332520"/>
+            <a:ext cx="3208320" cy="3332160"/>
           </a:xfrm>
           <a:prstGeom prst="rect">
             <a:avLst/>
@@ -5637,7 +5638,7 @@
         <p:spPr>
           <a:xfrm>
             <a:off x="5460120" y="4023360"/>
-            <a:ext cx="3774600" cy="2345760"/>
+            <a:ext cx="3774240" cy="2345400"/>
           </a:xfrm>
           <a:prstGeom prst="rect">
             <a:avLst/>
@@ -5705,7 +5706,7 @@
         <p:spPr>
           <a:xfrm>
             <a:off x="504000" y="301320"/>
-            <a:ext cx="9069840" cy="6829920"/>
+            <a:ext cx="9069480" cy="6829560"/>
           </a:xfrm>
           <a:prstGeom prst="rect">
             <a:avLst/>
@@ -5791,7 +5792,7 @@
         <p:spPr>
           <a:xfrm>
             <a:off x="504000" y="301320"/>
-            <a:ext cx="9069840" cy="1260360"/>
+            <a:ext cx="9069480" cy="1260000"/>
           </a:xfrm>
           <a:prstGeom prst="rect">
             <a:avLst/>
@@ -5830,7 +5831,7 @@
         <p:spPr>
           <a:xfrm>
             <a:off x="504000" y="1769040"/>
-            <a:ext cx="9069840" cy="4382640"/>
+            <a:ext cx="9069480" cy="4382280"/>
           </a:xfrm>
           <a:prstGeom prst="rect">
             <a:avLst/>
@@ -5916,7 +5917,7 @@
         <p:spPr>
           <a:xfrm>
             <a:off x="504000" y="301320"/>
-            <a:ext cx="9069840" cy="1260360"/>
+            <a:ext cx="9069480" cy="1260000"/>
           </a:xfrm>
           <a:prstGeom prst="rect">
             <a:avLst/>
@@ -5961,7 +5962,7 @@
         <p:spPr>
           <a:xfrm>
             <a:off x="822960" y="1563480"/>
-            <a:ext cx="8319240" cy="5292720"/>
+            <a:ext cx="8318880" cy="5292360"/>
           </a:xfrm>
           <a:prstGeom prst="rect">
             <a:avLst/>
@@ -5980,7 +5981,7 @@
         <p:spPr>
           <a:xfrm>
             <a:off x="4483080" y="3500640"/>
-            <a:ext cx="1110240" cy="555480"/>
+            <a:ext cx="1109880" cy="555120"/>
           </a:xfrm>
           <a:prstGeom prst="rect">
             <a:avLst/>
@@ -6064,7 +6065,7 @@
         <p:spPr>
           <a:xfrm>
             <a:off x="504000" y="301320"/>
-            <a:ext cx="9071280" cy="1261080"/>
+            <a:ext cx="9070920" cy="1260720"/>
           </a:xfrm>
           <a:prstGeom prst="rect">
             <a:avLst/>
@@ -6084,7 +6085,7 @@
         <p:spPr>
           <a:xfrm>
             <a:off x="365760" y="2103120"/>
-            <a:ext cx="9187920" cy="5037120"/>
+            <a:ext cx="9187560" cy="5036760"/>
           </a:xfrm>
           <a:prstGeom prst="rect">
             <a:avLst/>
@@ -6174,12 +6175,6 @@
               <a:rPr lang="en-US" sz="2200">
                 <a:latin typeface="Arial"/>
               </a:rPr>
-              <a:t> </a:t>
-            </a:r>
-            <a:r>
-              <a:rPr lang="en-US" sz="2200">
-                <a:latin typeface="Arial"/>
-              </a:rPr>
               <a:t>Requests information from the model that it uses to generate an output representation to the user</a:t>
             </a:r>
             <a:endParaRPr/>
@@ -6291,7 +6286,7 @@
         <p:spPr>
           <a:xfrm>
             <a:off x="504360" y="301320"/>
-            <a:ext cx="9069840" cy="1260360"/>
+            <a:ext cx="9069480" cy="1260000"/>
           </a:xfrm>
           <a:prstGeom prst="rect">
             <a:avLst/>
@@ -6379,7 +6374,7 @@
         <p:spPr>
           <a:xfrm>
             <a:off x="504000" y="301320"/>
-            <a:ext cx="9069840" cy="1260360"/>
+            <a:ext cx="9069480" cy="1260000"/>
           </a:xfrm>
           <a:prstGeom prst="rect">
             <a:avLst/>
@@ -6418,7 +6413,7 @@
         <p:spPr>
           <a:xfrm>
             <a:off x="504000" y="1769040"/>
-            <a:ext cx="9069840" cy="4382640"/>
+            <a:ext cx="9069480" cy="4382280"/>
           </a:xfrm>
           <a:prstGeom prst="rect">
             <a:avLst/>
@@ -6558,7 +6553,7 @@
         <p:spPr>
           <a:xfrm>
             <a:off x="504000" y="301320"/>
-            <a:ext cx="9069840" cy="1260360"/>
+            <a:ext cx="9069480" cy="1260000"/>
           </a:xfrm>
           <a:prstGeom prst="rect">
             <a:avLst/>
@@ -6597,7 +6592,7 @@
         <p:spPr>
           <a:xfrm>
             <a:off x="504000" y="1769040"/>
-            <a:ext cx="9069840" cy="4382640"/>
+            <a:ext cx="9069480" cy="4382280"/>
           </a:xfrm>
           <a:prstGeom prst="rect">
             <a:avLst/>
@@ -6619,10 +6614,10 @@
               <a:buChar char="l"/>
             </a:pPr>
             <a:r>
-              <a:rPr lang="en-US" sz="3200">
-                <a:latin typeface="Arial"/>
-              </a:rPr>
-              <a:t>- ASP.NET MVC </a:t>
+              <a:rPr lang="en-US" sz="2800">
+                <a:latin typeface="Arial"/>
+              </a:rPr>
+              <a:t>- ASP.NET MVC</a:t>
             </a:r>
             <a:endParaRPr/>
           </a:p>
@@ -6631,12 +6626,35 @@
               <a:lnSpc>
                 <a:spcPct val="100000"/>
               </a:lnSpc>
-              <a:buSzPct val="45000"/>
-              <a:buFont typeface="StarSymbol"/>
-              <a:buChar char="l"/>
-            </a:pPr>
-            <a:r>
-              <a:rPr lang="en-US" sz="3200">
+            </a:pPr>
+            <a:r>
+              <a:rPr lang="en-US" sz="2800">
+                <a:latin typeface="Arial"/>
+              </a:rPr>
+              <a:t>  </a:t>
+            </a:r>
+            <a:r>
+              <a:rPr lang="en-US" sz="2800">
+                <a:latin typeface="Arial"/>
+              </a:rPr>
+              <a:t>- AngularJS </a:t>
+            </a:r>
+            <a:endParaRPr/>
+          </a:p>
+          <a:p>
+            <a:pPr>
+              <a:lnSpc>
+                <a:spcPct val="100000"/>
+              </a:lnSpc>
+            </a:pPr>
+            <a:r>
+              <a:rPr lang="en-US" sz="2800">
+                <a:latin typeface="Arial"/>
+              </a:rPr>
+              <a:t>  </a:t>
+            </a:r>
+            <a:r>
+              <a:rPr lang="en-US" sz="2800">
                 <a:latin typeface="Arial"/>
               </a:rPr>
               <a:t>- Ruby on Rails </a:t>
@@ -6703,7 +6721,7 @@
         <p:spPr>
           <a:xfrm>
             <a:off x="504000" y="301320"/>
-            <a:ext cx="9069840" cy="6829920"/>
+            <a:ext cx="9069480" cy="6829560"/>
           </a:xfrm>
           <a:prstGeom prst="rect">
             <a:avLst/>
@@ -6789,7 +6807,7 @@
         <p:spPr>
           <a:xfrm>
             <a:off x="504000" y="301320"/>
-            <a:ext cx="9069840" cy="1260360"/>
+            <a:ext cx="9069480" cy="1260000"/>
           </a:xfrm>
           <a:prstGeom prst="rect">
             <a:avLst/>
@@ -6834,7 +6852,7 @@
         <p:spPr>
           <a:xfrm>
             <a:off x="0" y="1563120"/>
-            <a:ext cx="10078200" cy="5995080"/>
+            <a:ext cx="10077840" cy="5994720"/>
           </a:xfrm>
           <a:prstGeom prst="rect">
             <a:avLst/>

</xml_diff>